<commit_message>
add references and graphics for slides
</commit_message>
<xml_diff>
--- a/day2/R Workshop Day 2 Slides.pptx
+++ b/day2/R Workshop Day 2 Slides.pptx
@@ -5,39 +5,41 @@
     <p:sldMasterId id="2147483648" r:id="rId1"/>
   </p:sldMasterIdLst>
   <p:notesMasterIdLst>
-    <p:notesMasterId r:id="rId29"/>
+    <p:notesMasterId r:id="rId31"/>
   </p:notesMasterIdLst>
   <p:handoutMasterIdLst>
-    <p:handoutMasterId r:id="rId30"/>
+    <p:handoutMasterId r:id="rId32"/>
   </p:handoutMasterIdLst>
   <p:sldIdLst>
     <p:sldId id="260" r:id="rId2"/>
     <p:sldId id="288" r:id="rId3"/>
-    <p:sldId id="318" r:id="rId4"/>
-    <p:sldId id="302" r:id="rId5"/>
-    <p:sldId id="303" r:id="rId6"/>
-    <p:sldId id="304" r:id="rId7"/>
-    <p:sldId id="305" r:id="rId8"/>
-    <p:sldId id="306" r:id="rId9"/>
-    <p:sldId id="307" r:id="rId10"/>
-    <p:sldId id="308" r:id="rId11"/>
-    <p:sldId id="309" r:id="rId12"/>
-    <p:sldId id="319" r:id="rId13"/>
-    <p:sldId id="311" r:id="rId14"/>
-    <p:sldId id="320" r:id="rId15"/>
-    <p:sldId id="315" r:id="rId16"/>
-    <p:sldId id="312" r:id="rId17"/>
-    <p:sldId id="313" r:id="rId18"/>
-    <p:sldId id="314" r:id="rId19"/>
-    <p:sldId id="321" r:id="rId20"/>
-    <p:sldId id="316" r:id="rId21"/>
-    <p:sldId id="322" r:id="rId22"/>
-    <p:sldId id="317" r:id="rId23"/>
-    <p:sldId id="323" r:id="rId24"/>
-    <p:sldId id="324" r:id="rId25"/>
-    <p:sldId id="325" r:id="rId26"/>
-    <p:sldId id="326" r:id="rId27"/>
-    <p:sldId id="301" r:id="rId28"/>
+    <p:sldId id="327" r:id="rId4"/>
+    <p:sldId id="328" r:id="rId5"/>
+    <p:sldId id="318" r:id="rId6"/>
+    <p:sldId id="302" r:id="rId7"/>
+    <p:sldId id="303" r:id="rId8"/>
+    <p:sldId id="304" r:id="rId9"/>
+    <p:sldId id="305" r:id="rId10"/>
+    <p:sldId id="306" r:id="rId11"/>
+    <p:sldId id="307" r:id="rId12"/>
+    <p:sldId id="308" r:id="rId13"/>
+    <p:sldId id="309" r:id="rId14"/>
+    <p:sldId id="319" r:id="rId15"/>
+    <p:sldId id="311" r:id="rId16"/>
+    <p:sldId id="320" r:id="rId17"/>
+    <p:sldId id="315" r:id="rId18"/>
+    <p:sldId id="312" r:id="rId19"/>
+    <p:sldId id="313" r:id="rId20"/>
+    <p:sldId id="314" r:id="rId21"/>
+    <p:sldId id="321" r:id="rId22"/>
+    <p:sldId id="316" r:id="rId23"/>
+    <p:sldId id="322" r:id="rId24"/>
+    <p:sldId id="317" r:id="rId25"/>
+    <p:sldId id="323" r:id="rId26"/>
+    <p:sldId id="324" r:id="rId27"/>
+    <p:sldId id="325" r:id="rId28"/>
+    <p:sldId id="326" r:id="rId29"/>
+    <p:sldId id="301" r:id="rId30"/>
   </p:sldIdLst>
   <p:sldSz cx="9144000" cy="6858000" type="screen4x3"/>
   <p:notesSz cx="6858000" cy="9144000"/>
@@ -143,6 +145,8 @@
           <p14:sldIdLst>
             <p14:sldId id="260"/>
             <p14:sldId id="288"/>
+            <p14:sldId id="327"/>
+            <p14:sldId id="328"/>
             <p14:sldId id="318"/>
             <p14:sldId id="302"/>
             <p14:sldId id="303"/>
@@ -838,12 +842,7 @@
             <p:ph type="sldImg"/>
           </p:nvPr>
         </p:nvSpPr>
-        <p:spPr>
-          <a:xfrm>
-            <a:off x="1143000" y="685800"/>
-            <a:ext cx="4572000" cy="3429000"/>
-          </a:xfrm>
-        </p:spPr>
+        <p:spPr/>
       </p:sp>
       <p:sp>
         <p:nvSpPr>
@@ -871,7 +870,7 @@
             <a:spLocks noGrp="1"/>
           </p:cNvSpPr>
           <p:nvPr>
-            <p:ph type="sldNum" sz="quarter" idx="10"/>
+            <p:ph type="sldNum" sz="quarter" idx="5"/>
           </p:nvPr>
         </p:nvSpPr>
         <p:spPr/>
@@ -881,7 +880,7 @@
           <a:p>
             <a:fld id="{7B79852F-C953-3445-B10C-3B6B94EB422C}" type="slidenum">
               <a:rPr lang="en-US" smtClean="0"/>
-              <a:t>3</a:t>
+              <a:t>2</a:t>
             </a:fld>
             <a:endParaRPr lang="en-US"/>
           </a:p>
@@ -890,7 +889,7 @@
     </p:spTree>
     <p:extLst>
       <p:ext uri="{BB962C8B-B14F-4D97-AF65-F5344CB8AC3E}">
-        <p14:creationId xmlns:p14="http://schemas.microsoft.com/office/powerpoint/2010/main" val="3099826691"/>
+        <p14:creationId xmlns:p14="http://schemas.microsoft.com/office/powerpoint/2010/main" val="2579399522"/>
       </p:ext>
     </p:extLst>
   </p:cSld>
@@ -970,7 +969,7 @@
           <a:p>
             <a:fld id="{7B79852F-C953-3445-B10C-3B6B94EB422C}" type="slidenum">
               <a:rPr lang="en-US" smtClean="0"/>
-              <a:t>12</a:t>
+              <a:t>3</a:t>
             </a:fld>
             <a:endParaRPr lang="en-US"/>
           </a:p>
@@ -979,7 +978,7 @@
     </p:spTree>
     <p:extLst>
       <p:ext uri="{BB962C8B-B14F-4D97-AF65-F5344CB8AC3E}">
-        <p14:creationId xmlns:p14="http://schemas.microsoft.com/office/powerpoint/2010/main" val="843163510"/>
+        <p14:creationId xmlns:p14="http://schemas.microsoft.com/office/powerpoint/2010/main" val="3057618374"/>
       </p:ext>
     </p:extLst>
   </p:cSld>
@@ -1016,12 +1015,7 @@
             <p:ph type="sldImg"/>
           </p:nvPr>
         </p:nvSpPr>
-        <p:spPr>
-          <a:xfrm>
-            <a:off x="1143000" y="685800"/>
-            <a:ext cx="4572000" cy="3429000"/>
-          </a:xfrm>
-        </p:spPr>
+        <p:spPr/>
       </p:sp>
       <p:sp>
         <p:nvSpPr>
@@ -1038,7 +1032,18 @@
           <a:bodyPr/>
           <a:lstStyle/>
           <a:p>
-            <a:endParaRPr lang="en-US" dirty="0"/>
+            <a:r>
+              <a:rPr lang="en-US" dirty="0"/>
+              <a:t>Graphic from https://</a:t>
+            </a:r>
+            <a:r>
+              <a:rPr lang="en-US" dirty="0" err="1"/>
+              <a:t>datamanagement.iu.edu</a:t>
+            </a:r>
+            <a:r>
+              <a:rPr lang="en-US"/>
+              <a:t>/</a:t>
+            </a:r>
           </a:p>
         </p:txBody>
       </p:sp>
@@ -1049,7 +1054,7 @@
             <a:spLocks noGrp="1"/>
           </p:cNvSpPr>
           <p:nvPr>
-            <p:ph type="sldNum" sz="quarter" idx="10"/>
+            <p:ph type="sldNum" sz="quarter" idx="5"/>
           </p:nvPr>
         </p:nvSpPr>
         <p:spPr/>
@@ -1059,7 +1064,7 @@
           <a:p>
             <a:fld id="{7B79852F-C953-3445-B10C-3B6B94EB422C}" type="slidenum">
               <a:rPr lang="en-US" smtClean="0"/>
-              <a:t>14</a:t>
+              <a:t>4</a:t>
             </a:fld>
             <a:endParaRPr lang="en-US"/>
           </a:p>
@@ -1068,7 +1073,7 @@
     </p:spTree>
     <p:extLst>
       <p:ext uri="{BB962C8B-B14F-4D97-AF65-F5344CB8AC3E}">
-        <p14:creationId xmlns:p14="http://schemas.microsoft.com/office/powerpoint/2010/main" val="793890532"/>
+        <p14:creationId xmlns:p14="http://schemas.microsoft.com/office/powerpoint/2010/main" val="475653079"/>
       </p:ext>
     </p:extLst>
   </p:cSld>
@@ -1148,7 +1153,7 @@
           <a:p>
             <a:fld id="{7B79852F-C953-3445-B10C-3B6B94EB422C}" type="slidenum">
               <a:rPr lang="en-US" smtClean="0"/>
-              <a:t>19</a:t>
+              <a:t>5</a:t>
             </a:fld>
             <a:endParaRPr lang="en-US"/>
           </a:p>
@@ -1157,7 +1162,7 @@
     </p:spTree>
     <p:extLst>
       <p:ext uri="{BB962C8B-B14F-4D97-AF65-F5344CB8AC3E}">
-        <p14:creationId xmlns:p14="http://schemas.microsoft.com/office/powerpoint/2010/main" val="26739191"/>
+        <p14:creationId xmlns:p14="http://schemas.microsoft.com/office/powerpoint/2010/main" val="3099826691"/>
       </p:ext>
     </p:extLst>
   </p:cSld>
@@ -1237,7 +1242,274 @@
           <a:p>
             <a:fld id="{7B79852F-C953-3445-B10C-3B6B94EB422C}" type="slidenum">
               <a:rPr lang="en-US" smtClean="0"/>
+              <a:t>14</a:t>
+            </a:fld>
+            <a:endParaRPr lang="en-US"/>
+          </a:p>
+        </p:txBody>
+      </p:sp>
+    </p:spTree>
+    <p:extLst>
+      <p:ext uri="{BB962C8B-B14F-4D97-AF65-F5344CB8AC3E}">
+        <p14:creationId xmlns:p14="http://schemas.microsoft.com/office/powerpoint/2010/main" val="843163510"/>
+      </p:ext>
+    </p:extLst>
+  </p:cSld>
+  <p:clrMapOvr>
+    <a:masterClrMapping/>
+  </p:clrMapOvr>
+</p:notes>
+</file>
+
+<file path=ppt/notesSlides/notesSlide7.xml><?xml version="1.0" encoding="utf-8"?>
+<p:notes xmlns:a="http://schemas.openxmlformats.org/drawingml/2006/main" xmlns:r="http://schemas.openxmlformats.org/officeDocument/2006/relationships" xmlns:p="http://schemas.openxmlformats.org/presentationml/2006/main">
+  <p:cSld>
+    <p:spTree>
+      <p:nvGrpSpPr>
+        <p:cNvPr id="1" name=""/>
+        <p:cNvGrpSpPr/>
+        <p:nvPr/>
+      </p:nvGrpSpPr>
+      <p:grpSpPr>
+        <a:xfrm>
+          <a:off x="0" y="0"/>
+          <a:ext cx="0" cy="0"/>
+          <a:chOff x="0" y="0"/>
+          <a:chExt cx="0" cy="0"/>
+        </a:xfrm>
+      </p:grpSpPr>
+      <p:sp>
+        <p:nvSpPr>
+          <p:cNvPr id="2" name="Slide Image Placeholder 1"/>
+          <p:cNvSpPr>
+            <a:spLocks noGrp="1" noRot="1" noChangeAspect="1"/>
+          </p:cNvSpPr>
+          <p:nvPr>
+            <p:ph type="sldImg"/>
+          </p:nvPr>
+        </p:nvSpPr>
+        <p:spPr>
+          <a:xfrm>
+            <a:off x="1143000" y="685800"/>
+            <a:ext cx="4572000" cy="3429000"/>
+          </a:xfrm>
+        </p:spPr>
+      </p:sp>
+      <p:sp>
+        <p:nvSpPr>
+          <p:cNvPr id="3" name="Notes Placeholder 2"/>
+          <p:cNvSpPr>
+            <a:spLocks noGrp="1"/>
+          </p:cNvSpPr>
+          <p:nvPr>
+            <p:ph type="body" idx="1"/>
+          </p:nvPr>
+        </p:nvSpPr>
+        <p:spPr/>
+        <p:txBody>
+          <a:bodyPr/>
+          <a:lstStyle/>
+          <a:p>
+            <a:endParaRPr lang="en-US" dirty="0"/>
+          </a:p>
+        </p:txBody>
+      </p:sp>
+      <p:sp>
+        <p:nvSpPr>
+          <p:cNvPr id="4" name="Slide Number Placeholder 3"/>
+          <p:cNvSpPr>
+            <a:spLocks noGrp="1"/>
+          </p:cNvSpPr>
+          <p:nvPr>
+            <p:ph type="sldNum" sz="quarter" idx="10"/>
+          </p:nvPr>
+        </p:nvSpPr>
+        <p:spPr/>
+        <p:txBody>
+          <a:bodyPr/>
+          <a:lstStyle/>
+          <a:p>
+            <a:fld id="{7B79852F-C953-3445-B10C-3B6B94EB422C}" type="slidenum">
+              <a:rPr lang="en-US" smtClean="0"/>
+              <a:t>16</a:t>
+            </a:fld>
+            <a:endParaRPr lang="en-US"/>
+          </a:p>
+        </p:txBody>
+      </p:sp>
+    </p:spTree>
+    <p:extLst>
+      <p:ext uri="{BB962C8B-B14F-4D97-AF65-F5344CB8AC3E}">
+        <p14:creationId xmlns:p14="http://schemas.microsoft.com/office/powerpoint/2010/main" val="793890532"/>
+      </p:ext>
+    </p:extLst>
+  </p:cSld>
+  <p:clrMapOvr>
+    <a:masterClrMapping/>
+  </p:clrMapOvr>
+</p:notes>
+</file>
+
+<file path=ppt/notesSlides/notesSlide8.xml><?xml version="1.0" encoding="utf-8"?>
+<p:notes xmlns:a="http://schemas.openxmlformats.org/drawingml/2006/main" xmlns:r="http://schemas.openxmlformats.org/officeDocument/2006/relationships" xmlns:p="http://schemas.openxmlformats.org/presentationml/2006/main">
+  <p:cSld>
+    <p:spTree>
+      <p:nvGrpSpPr>
+        <p:cNvPr id="1" name=""/>
+        <p:cNvGrpSpPr/>
+        <p:nvPr/>
+      </p:nvGrpSpPr>
+      <p:grpSpPr>
+        <a:xfrm>
+          <a:off x="0" y="0"/>
+          <a:ext cx="0" cy="0"/>
+          <a:chOff x="0" y="0"/>
+          <a:chExt cx="0" cy="0"/>
+        </a:xfrm>
+      </p:grpSpPr>
+      <p:sp>
+        <p:nvSpPr>
+          <p:cNvPr id="2" name="Slide Image Placeholder 1"/>
+          <p:cNvSpPr>
+            <a:spLocks noGrp="1" noRot="1" noChangeAspect="1"/>
+          </p:cNvSpPr>
+          <p:nvPr>
+            <p:ph type="sldImg"/>
+          </p:nvPr>
+        </p:nvSpPr>
+        <p:spPr>
+          <a:xfrm>
+            <a:off x="1143000" y="685800"/>
+            <a:ext cx="4572000" cy="3429000"/>
+          </a:xfrm>
+        </p:spPr>
+      </p:sp>
+      <p:sp>
+        <p:nvSpPr>
+          <p:cNvPr id="3" name="Notes Placeholder 2"/>
+          <p:cNvSpPr>
+            <a:spLocks noGrp="1"/>
+          </p:cNvSpPr>
+          <p:nvPr>
+            <p:ph type="body" idx="1"/>
+          </p:nvPr>
+        </p:nvSpPr>
+        <p:spPr/>
+        <p:txBody>
+          <a:bodyPr/>
+          <a:lstStyle/>
+          <a:p>
+            <a:endParaRPr lang="en-US" dirty="0"/>
+          </a:p>
+        </p:txBody>
+      </p:sp>
+      <p:sp>
+        <p:nvSpPr>
+          <p:cNvPr id="4" name="Slide Number Placeholder 3"/>
+          <p:cNvSpPr>
+            <a:spLocks noGrp="1"/>
+          </p:cNvSpPr>
+          <p:nvPr>
+            <p:ph type="sldNum" sz="quarter" idx="10"/>
+          </p:nvPr>
+        </p:nvSpPr>
+        <p:spPr/>
+        <p:txBody>
+          <a:bodyPr/>
+          <a:lstStyle/>
+          <a:p>
+            <a:fld id="{7B79852F-C953-3445-B10C-3B6B94EB422C}" type="slidenum">
+              <a:rPr lang="en-US" smtClean="0"/>
               <a:t>21</a:t>
+            </a:fld>
+            <a:endParaRPr lang="en-US"/>
+          </a:p>
+        </p:txBody>
+      </p:sp>
+    </p:spTree>
+    <p:extLst>
+      <p:ext uri="{BB962C8B-B14F-4D97-AF65-F5344CB8AC3E}">
+        <p14:creationId xmlns:p14="http://schemas.microsoft.com/office/powerpoint/2010/main" val="26739191"/>
+      </p:ext>
+    </p:extLst>
+  </p:cSld>
+  <p:clrMapOvr>
+    <a:masterClrMapping/>
+  </p:clrMapOvr>
+</p:notes>
+</file>
+
+<file path=ppt/notesSlides/notesSlide9.xml><?xml version="1.0" encoding="utf-8"?>
+<p:notes xmlns:a="http://schemas.openxmlformats.org/drawingml/2006/main" xmlns:r="http://schemas.openxmlformats.org/officeDocument/2006/relationships" xmlns:p="http://schemas.openxmlformats.org/presentationml/2006/main">
+  <p:cSld>
+    <p:spTree>
+      <p:nvGrpSpPr>
+        <p:cNvPr id="1" name=""/>
+        <p:cNvGrpSpPr/>
+        <p:nvPr/>
+      </p:nvGrpSpPr>
+      <p:grpSpPr>
+        <a:xfrm>
+          <a:off x="0" y="0"/>
+          <a:ext cx="0" cy="0"/>
+          <a:chOff x="0" y="0"/>
+          <a:chExt cx="0" cy="0"/>
+        </a:xfrm>
+      </p:grpSpPr>
+      <p:sp>
+        <p:nvSpPr>
+          <p:cNvPr id="2" name="Slide Image Placeholder 1"/>
+          <p:cNvSpPr>
+            <a:spLocks noGrp="1" noRot="1" noChangeAspect="1"/>
+          </p:cNvSpPr>
+          <p:nvPr>
+            <p:ph type="sldImg"/>
+          </p:nvPr>
+        </p:nvSpPr>
+        <p:spPr>
+          <a:xfrm>
+            <a:off x="1143000" y="685800"/>
+            <a:ext cx="4572000" cy="3429000"/>
+          </a:xfrm>
+        </p:spPr>
+      </p:sp>
+      <p:sp>
+        <p:nvSpPr>
+          <p:cNvPr id="3" name="Notes Placeholder 2"/>
+          <p:cNvSpPr>
+            <a:spLocks noGrp="1"/>
+          </p:cNvSpPr>
+          <p:nvPr>
+            <p:ph type="body" idx="1"/>
+          </p:nvPr>
+        </p:nvSpPr>
+        <p:spPr/>
+        <p:txBody>
+          <a:bodyPr/>
+          <a:lstStyle/>
+          <a:p>
+            <a:endParaRPr lang="en-US" dirty="0"/>
+          </a:p>
+        </p:txBody>
+      </p:sp>
+      <p:sp>
+        <p:nvSpPr>
+          <p:cNvPr id="4" name="Slide Number Placeholder 3"/>
+          <p:cNvSpPr>
+            <a:spLocks noGrp="1"/>
+          </p:cNvSpPr>
+          <p:nvPr>
+            <p:ph type="sldNum" sz="quarter" idx="10"/>
+          </p:nvPr>
+        </p:nvSpPr>
+        <p:spPr/>
+        <p:txBody>
+          <a:bodyPr/>
+          <a:lstStyle/>
+          <a:p>
+            <a:fld id="{7B79852F-C953-3445-B10C-3B6B94EB422C}" type="slidenum">
+              <a:rPr lang="en-US" smtClean="0"/>
+              <a:t>23</a:t>
             </a:fld>
             <a:endParaRPr lang="en-US"/>
           </a:p>
@@ -4674,7 +4946,7 @@
           <a:p>
             <a:r>
               <a:rPr lang="en-US" sz="3200" dirty="0"/>
-              <a:t>Vectors</a:t>
+              <a:t>Check your understanding</a:t>
             </a:r>
           </a:p>
         </p:txBody>
@@ -4682,7 +4954,7 @@
     </p:spTree>
     <p:extLst>
       <p:ext uri="{BB962C8B-B14F-4D97-AF65-F5344CB8AC3E}">
-        <p14:creationId xmlns:p14="http://schemas.microsoft.com/office/powerpoint/2010/main" val="3549059115"/>
+        <p14:creationId xmlns:p14="http://schemas.microsoft.com/office/powerpoint/2010/main" val="3384428109"/>
       </p:ext>
     </p:extLst>
   </p:cSld>
@@ -4755,7 +5027,7 @@
           <a:p>
             <a:r>
               <a:rPr lang="en-US" sz="3200" dirty="0"/>
-              <a:t>Data Frames</a:t>
+              <a:t>Data Structures in R</a:t>
             </a:r>
           </a:p>
         </p:txBody>
@@ -4763,7 +5035,7 @@
     </p:spTree>
     <p:extLst>
       <p:ext uri="{BB962C8B-B14F-4D97-AF65-F5344CB8AC3E}">
-        <p14:creationId xmlns:p14="http://schemas.microsoft.com/office/powerpoint/2010/main" val="2491765770"/>
+        <p14:creationId xmlns:p14="http://schemas.microsoft.com/office/powerpoint/2010/main" val="3233372863"/>
       </p:ext>
     </p:extLst>
   </p:cSld>
@@ -4792,48 +5064,13 @@
       </p:grpSpPr>
       <p:sp>
         <p:nvSpPr>
-          <p:cNvPr id="10" name="Rectangle 9"/>
-          <p:cNvSpPr/>
-          <p:nvPr/>
-        </p:nvSpPr>
-        <p:spPr>
-          <a:xfrm>
-            <a:off x="-1" y="1330504"/>
-            <a:ext cx="9144001" cy="5527496"/>
-          </a:xfrm>
-          <a:prstGeom prst="rect">
-            <a:avLst/>
-          </a:prstGeom>
-          <a:solidFill>
-            <a:srgbClr val="041E42"/>
-          </a:solidFill>
-        </p:spPr>
-        <p:style>
-          <a:lnRef idx="1">
-            <a:schemeClr val="accent1"/>
-          </a:lnRef>
-          <a:fillRef idx="3">
-            <a:schemeClr val="accent1"/>
-          </a:fillRef>
-          <a:effectRef idx="2">
-            <a:schemeClr val="accent1"/>
-          </a:effectRef>
-          <a:fontRef idx="minor">
-            <a:schemeClr val="lt1"/>
-          </a:fontRef>
-        </p:style>
-        <p:txBody>
-          <a:bodyPr rtlCol="0" anchor="ctr"/>
-          <a:lstStyle/>
-          <a:p>
-            <a:pPr algn="ctr"/>
-            <a:endParaRPr lang="en-US" sz="1350" dirty="0"/>
-          </a:p>
-        </p:txBody>
-      </p:sp>
-      <p:sp>
-        <p:nvSpPr>
-          <p:cNvPr id="8" name="Title 5"/>
+          <p:cNvPr id="2" name="Title 2">
+            <a:extLst>
+              <a:ext uri="{FF2B5EF4-FFF2-40B4-BE49-F238E27FC236}">
+                <a16:creationId xmlns:a16="http://schemas.microsoft.com/office/drawing/2014/main" id="{12BEE06C-3CB4-1A31-1F99-81886307D619}"/>
+              </a:ext>
+            </a:extLst>
+          </p:cNvPr>
           <p:cNvSpPr txBox="1">
             <a:spLocks/>
           </p:cNvSpPr>
@@ -4841,8 +5078,8 @@
         </p:nvSpPr>
         <p:spPr>
           <a:xfrm>
-            <a:off x="383218" y="1477992"/>
-            <a:ext cx="7954732" cy="815898"/>
+            <a:off x="429870" y="306381"/>
+            <a:ext cx="6598728" cy="1143000"/>
           </a:xfrm>
           <a:prstGeom prst="rect">
             <a:avLst/>
@@ -4853,63 +5090,33 @@
             <a:noAutofit/>
           </a:bodyPr>
           <a:lstStyle>
-            <a:lvl1pPr algn="ctr" defTabSz="457200" rtl="0" eaLnBrk="1" latinLnBrk="0" hangingPunct="1">
+            <a:lvl1pPr algn="l" defTabSz="342991" rtl="0" eaLnBrk="1" latinLnBrk="0" hangingPunct="1">
               <a:spcBef>
                 <a:spcPct val="0"/>
               </a:spcBef>
               <a:buNone/>
-              <a:defRPr sz="4200" b="0" i="1" kern="1200">
+              <a:defRPr sz="2701" b="1" i="0" kern="1200">
                 <a:solidFill>
                   <a:srgbClr val="002D50"/>
                 </a:solidFill>
-                <a:latin typeface="Adobe Caslon Pro"/>
+                <a:latin typeface="Helvetica Neue"/>
                 <a:ea typeface="+mj-ea"/>
-                <a:cs typeface="Adobe Caslon Pro"/>
+                <a:cs typeface="Helvetica Neue"/>
               </a:defRPr>
             </a:lvl1pPr>
           </a:lstStyle>
           <a:p>
-            <a:pPr algn="l"/>
-            <a:r>
-              <a:rPr lang="en-US" sz="4051" dirty="0">
-                <a:solidFill>
-                  <a:schemeClr val="bg1"/>
-                </a:solidFill>
-                <a:latin typeface="Helvetica Neue"/>
-                <a:cs typeface="Helvetica Neue"/>
-              </a:rPr>
-              <a:t>Reading in a new dataset</a:t>
-            </a:r>
-          </a:p>
-        </p:txBody>
-      </p:sp>
-      <p:pic>
-        <p:nvPicPr>
-          <p:cNvPr id="12" name="Picture 11"/>
-          <p:cNvPicPr>
-            <a:picLocks noChangeAspect="1"/>
-          </p:cNvPicPr>
-          <p:nvPr/>
-        </p:nvPicPr>
-        <p:blipFill>
-          <a:blip r:embed="rId3"/>
-          <a:srcRect/>
-          <a:stretch/>
-        </p:blipFill>
-        <p:spPr>
-          <a:xfrm>
-            <a:off x="263465" y="398530"/>
-            <a:ext cx="5120827" cy="556906"/>
-          </a:xfrm>
-          <a:prstGeom prst="rect">
-            <a:avLst/>
-          </a:prstGeom>
-        </p:spPr>
-      </p:pic>
+            <a:r>
+              <a:rPr lang="en-US" sz="3200" dirty="0"/>
+              <a:t>Vectors</a:t>
+            </a:r>
+          </a:p>
+        </p:txBody>
+      </p:sp>
     </p:spTree>
     <p:extLst>
       <p:ext uri="{BB962C8B-B14F-4D97-AF65-F5344CB8AC3E}">
-        <p14:creationId xmlns:p14="http://schemas.microsoft.com/office/powerpoint/2010/main" val="4047090485"/>
+        <p14:creationId xmlns:p14="http://schemas.microsoft.com/office/powerpoint/2010/main" val="3549059115"/>
       </p:ext>
     </p:extLst>
   </p:cSld>
@@ -4982,7 +5189,7 @@
           <a:p>
             <a:r>
               <a:rPr lang="en-US" sz="3200" dirty="0"/>
-              <a:t>Loading data</a:t>
+              <a:t>Data Frames</a:t>
             </a:r>
           </a:p>
         </p:txBody>
@@ -4990,7 +5197,7 @@
     </p:spTree>
     <p:extLst>
       <p:ext uri="{BB962C8B-B14F-4D97-AF65-F5344CB8AC3E}">
-        <p14:creationId xmlns:p14="http://schemas.microsoft.com/office/powerpoint/2010/main" val="2147741963"/>
+        <p14:creationId xmlns:p14="http://schemas.microsoft.com/office/powerpoint/2010/main" val="2491765770"/>
       </p:ext>
     </p:extLst>
   </p:cSld>
@@ -5105,7 +5312,7 @@
                 <a:latin typeface="Helvetica Neue"/>
                 <a:cs typeface="Helvetica Neue"/>
               </a:rPr>
-              <a:t>Data cleaning</a:t>
+              <a:t>Reading in a new dataset</a:t>
             </a:r>
           </a:p>
         </p:txBody>
@@ -5136,7 +5343,7 @@
     </p:spTree>
     <p:extLst>
       <p:ext uri="{BB962C8B-B14F-4D97-AF65-F5344CB8AC3E}">
-        <p14:creationId xmlns:p14="http://schemas.microsoft.com/office/powerpoint/2010/main" val="2368051513"/>
+        <p14:creationId xmlns:p14="http://schemas.microsoft.com/office/powerpoint/2010/main" val="4047090485"/>
       </p:ext>
     </p:extLst>
   </p:cSld>
@@ -5209,7 +5416,7 @@
           <a:p>
             <a:r>
               <a:rPr lang="en-US" sz="3200" dirty="0"/>
-              <a:t>Data cleaning</a:t>
+              <a:t>Loading data</a:t>
             </a:r>
           </a:p>
         </p:txBody>
@@ -5217,7 +5424,7 @@
     </p:spTree>
     <p:extLst>
       <p:ext uri="{BB962C8B-B14F-4D97-AF65-F5344CB8AC3E}">
-        <p14:creationId xmlns:p14="http://schemas.microsoft.com/office/powerpoint/2010/main" val="939007962"/>
+        <p14:creationId xmlns:p14="http://schemas.microsoft.com/office/powerpoint/2010/main" val="2147741963"/>
       </p:ext>
     </p:extLst>
   </p:cSld>
@@ -5246,13 +5453,48 @@
       </p:grpSpPr>
       <p:sp>
         <p:nvSpPr>
-          <p:cNvPr id="2" name="Title 2">
-            <a:extLst>
-              <a:ext uri="{FF2B5EF4-FFF2-40B4-BE49-F238E27FC236}">
-                <a16:creationId xmlns:a16="http://schemas.microsoft.com/office/drawing/2014/main" id="{12BEE06C-3CB4-1A31-1F99-81886307D619}"/>
-              </a:ext>
-            </a:extLst>
-          </p:cNvPr>
+          <p:cNvPr id="10" name="Rectangle 9"/>
+          <p:cNvSpPr/>
+          <p:nvPr/>
+        </p:nvSpPr>
+        <p:spPr>
+          <a:xfrm>
+            <a:off x="-1" y="1330504"/>
+            <a:ext cx="9144001" cy="5527496"/>
+          </a:xfrm>
+          <a:prstGeom prst="rect">
+            <a:avLst/>
+          </a:prstGeom>
+          <a:solidFill>
+            <a:srgbClr val="041E42"/>
+          </a:solidFill>
+        </p:spPr>
+        <p:style>
+          <a:lnRef idx="1">
+            <a:schemeClr val="accent1"/>
+          </a:lnRef>
+          <a:fillRef idx="3">
+            <a:schemeClr val="accent1"/>
+          </a:fillRef>
+          <a:effectRef idx="2">
+            <a:schemeClr val="accent1"/>
+          </a:effectRef>
+          <a:fontRef idx="minor">
+            <a:schemeClr val="lt1"/>
+          </a:fontRef>
+        </p:style>
+        <p:txBody>
+          <a:bodyPr rtlCol="0" anchor="ctr"/>
+          <a:lstStyle/>
+          <a:p>
+            <a:pPr algn="ctr"/>
+            <a:endParaRPr lang="en-US" sz="1350" dirty="0"/>
+          </a:p>
+        </p:txBody>
+      </p:sp>
+      <p:sp>
+        <p:nvSpPr>
+          <p:cNvPr id="8" name="Title 5"/>
           <p:cNvSpPr txBox="1">
             <a:spLocks/>
           </p:cNvSpPr>
@@ -5260,8 +5502,8 @@
         </p:nvSpPr>
         <p:spPr>
           <a:xfrm>
-            <a:off x="429870" y="306381"/>
-            <a:ext cx="6598728" cy="1143000"/>
+            <a:off x="383218" y="1477992"/>
+            <a:ext cx="7954732" cy="815898"/>
           </a:xfrm>
           <a:prstGeom prst="rect">
             <a:avLst/>
@@ -5272,33 +5514,63 @@
             <a:noAutofit/>
           </a:bodyPr>
           <a:lstStyle>
-            <a:lvl1pPr algn="l" defTabSz="342991" rtl="0" eaLnBrk="1" latinLnBrk="0" hangingPunct="1">
+            <a:lvl1pPr algn="ctr" defTabSz="457200" rtl="0" eaLnBrk="1" latinLnBrk="0" hangingPunct="1">
               <a:spcBef>
                 <a:spcPct val="0"/>
               </a:spcBef>
               <a:buNone/>
-              <a:defRPr sz="2701" b="1" i="0" kern="1200">
+              <a:defRPr sz="4200" b="0" i="1" kern="1200">
                 <a:solidFill>
                   <a:srgbClr val="002D50"/>
                 </a:solidFill>
-                <a:latin typeface="Helvetica Neue"/>
+                <a:latin typeface="Adobe Caslon Pro"/>
                 <a:ea typeface="+mj-ea"/>
-                <a:cs typeface="Helvetica Neue"/>
+                <a:cs typeface="Adobe Caslon Pro"/>
               </a:defRPr>
             </a:lvl1pPr>
           </a:lstStyle>
           <a:p>
-            <a:r>
-              <a:rPr lang="en-US" sz="3200" dirty="0"/>
-              <a:t>View your dataset in RStudio</a:t>
-            </a:r>
-          </a:p>
-        </p:txBody>
-      </p:sp>
+            <a:pPr algn="l"/>
+            <a:r>
+              <a:rPr lang="en-US" sz="4051" dirty="0">
+                <a:solidFill>
+                  <a:schemeClr val="bg1"/>
+                </a:solidFill>
+                <a:latin typeface="Helvetica Neue"/>
+                <a:cs typeface="Helvetica Neue"/>
+              </a:rPr>
+              <a:t>Data cleaning</a:t>
+            </a:r>
+          </a:p>
+        </p:txBody>
+      </p:sp>
+      <p:pic>
+        <p:nvPicPr>
+          <p:cNvPr id="12" name="Picture 11"/>
+          <p:cNvPicPr>
+            <a:picLocks noChangeAspect="1"/>
+          </p:cNvPicPr>
+          <p:nvPr/>
+        </p:nvPicPr>
+        <p:blipFill>
+          <a:blip r:embed="rId3"/>
+          <a:srcRect/>
+          <a:stretch/>
+        </p:blipFill>
+        <p:spPr>
+          <a:xfrm>
+            <a:off x="263465" y="398530"/>
+            <a:ext cx="5120827" cy="556906"/>
+          </a:xfrm>
+          <a:prstGeom prst="rect">
+            <a:avLst/>
+          </a:prstGeom>
+        </p:spPr>
+      </p:pic>
     </p:spTree>
     <p:extLst>
       <p:ext uri="{BB962C8B-B14F-4D97-AF65-F5344CB8AC3E}">
-        <p14:creationId xmlns:p14="http://schemas.microsoft.com/office/powerpoint/2010/main" val="2614115046"/>
+        <p14:creationId xmlns:p14="http://schemas.microsoft.com/office/powerpoint/2010/main" val="2368051513"/>
       </p:ext>
     </p:extLst>
   </p:cSld>
@@ -5371,7 +5643,7 @@
           <a:p>
             <a:r>
               <a:rPr lang="en-US" sz="3200" dirty="0"/>
-              <a:t>Check for missing values</a:t>
+              <a:t>Data cleaning</a:t>
             </a:r>
           </a:p>
         </p:txBody>
@@ -5379,7 +5651,7 @@
     </p:spTree>
     <p:extLst>
       <p:ext uri="{BB962C8B-B14F-4D97-AF65-F5344CB8AC3E}">
-        <p14:creationId xmlns:p14="http://schemas.microsoft.com/office/powerpoint/2010/main" val="1908492203"/>
+        <p14:creationId xmlns:p14="http://schemas.microsoft.com/office/powerpoint/2010/main" val="939007962"/>
       </p:ext>
     </p:extLst>
   </p:cSld>
@@ -5452,7 +5724,7 @@
           <a:p>
             <a:r>
               <a:rPr lang="en-US" sz="3200" dirty="0"/>
-              <a:t>Ask questions about your data</a:t>
+              <a:t>View your dataset in RStudio</a:t>
             </a:r>
           </a:p>
         </p:txBody>
@@ -5460,7 +5732,7 @@
     </p:spTree>
     <p:extLst>
       <p:ext uri="{BB962C8B-B14F-4D97-AF65-F5344CB8AC3E}">
-        <p14:creationId xmlns:p14="http://schemas.microsoft.com/office/powerpoint/2010/main" val="2484998092"/>
+        <p14:creationId xmlns:p14="http://schemas.microsoft.com/office/powerpoint/2010/main" val="2614115046"/>
       </p:ext>
     </p:extLst>
   </p:cSld>
@@ -5489,48 +5761,13 @@
       </p:grpSpPr>
       <p:sp>
         <p:nvSpPr>
-          <p:cNvPr id="10" name="Rectangle 9"/>
-          <p:cNvSpPr/>
-          <p:nvPr/>
-        </p:nvSpPr>
-        <p:spPr>
-          <a:xfrm>
-            <a:off x="-1" y="1330504"/>
-            <a:ext cx="9144001" cy="5527496"/>
-          </a:xfrm>
-          <a:prstGeom prst="rect">
-            <a:avLst/>
-          </a:prstGeom>
-          <a:solidFill>
-            <a:srgbClr val="041E42"/>
-          </a:solidFill>
-        </p:spPr>
-        <p:style>
-          <a:lnRef idx="1">
-            <a:schemeClr val="accent1"/>
-          </a:lnRef>
-          <a:fillRef idx="3">
-            <a:schemeClr val="accent1"/>
-          </a:fillRef>
-          <a:effectRef idx="2">
-            <a:schemeClr val="accent1"/>
-          </a:effectRef>
-          <a:fontRef idx="minor">
-            <a:schemeClr val="lt1"/>
-          </a:fontRef>
-        </p:style>
-        <p:txBody>
-          <a:bodyPr rtlCol="0" anchor="ctr"/>
-          <a:lstStyle/>
-          <a:p>
-            <a:pPr algn="ctr"/>
-            <a:endParaRPr lang="en-US" sz="1350" dirty="0"/>
-          </a:p>
-        </p:txBody>
-      </p:sp>
-      <p:sp>
-        <p:nvSpPr>
-          <p:cNvPr id="8" name="Title 5"/>
+          <p:cNvPr id="2" name="Title 2">
+            <a:extLst>
+              <a:ext uri="{FF2B5EF4-FFF2-40B4-BE49-F238E27FC236}">
+                <a16:creationId xmlns:a16="http://schemas.microsoft.com/office/drawing/2014/main" id="{12BEE06C-3CB4-1A31-1F99-81886307D619}"/>
+              </a:ext>
+            </a:extLst>
+          </p:cNvPr>
           <p:cNvSpPr txBox="1">
             <a:spLocks/>
           </p:cNvSpPr>
@@ -5538,8 +5775,8 @@
         </p:nvSpPr>
         <p:spPr>
           <a:xfrm>
-            <a:off x="383218" y="1477992"/>
-            <a:ext cx="7954732" cy="815898"/>
+            <a:off x="429870" y="306381"/>
+            <a:ext cx="6598728" cy="1143000"/>
           </a:xfrm>
           <a:prstGeom prst="rect">
             <a:avLst/>
@@ -5550,63 +5787,33 @@
             <a:noAutofit/>
           </a:bodyPr>
           <a:lstStyle>
-            <a:lvl1pPr algn="ctr" defTabSz="457200" rtl="0" eaLnBrk="1" latinLnBrk="0" hangingPunct="1">
+            <a:lvl1pPr algn="l" defTabSz="342991" rtl="0" eaLnBrk="1" latinLnBrk="0" hangingPunct="1">
               <a:spcBef>
                 <a:spcPct val="0"/>
               </a:spcBef>
               <a:buNone/>
-              <a:defRPr sz="4200" b="0" i="1" kern="1200">
+              <a:defRPr sz="2701" b="1" i="0" kern="1200">
                 <a:solidFill>
                   <a:srgbClr val="002D50"/>
                 </a:solidFill>
-                <a:latin typeface="Adobe Caslon Pro"/>
+                <a:latin typeface="Helvetica Neue"/>
                 <a:ea typeface="+mj-ea"/>
-                <a:cs typeface="Adobe Caslon Pro"/>
+                <a:cs typeface="Helvetica Neue"/>
               </a:defRPr>
             </a:lvl1pPr>
           </a:lstStyle>
           <a:p>
-            <a:pPr algn="l"/>
-            <a:r>
-              <a:rPr lang="en-US" sz="4051" dirty="0">
-                <a:solidFill>
-                  <a:schemeClr val="bg1"/>
-                </a:solidFill>
-                <a:latin typeface="Helvetica Neue"/>
-                <a:cs typeface="Helvetica Neue"/>
-              </a:rPr>
-              <a:t>Healthcare and public health datasets</a:t>
-            </a:r>
-          </a:p>
-        </p:txBody>
-      </p:sp>
-      <p:pic>
-        <p:nvPicPr>
-          <p:cNvPr id="12" name="Picture 11"/>
-          <p:cNvPicPr>
-            <a:picLocks noChangeAspect="1"/>
-          </p:cNvPicPr>
-          <p:nvPr/>
-        </p:nvPicPr>
-        <p:blipFill>
-          <a:blip r:embed="rId3"/>
-          <a:srcRect/>
-          <a:stretch/>
-        </p:blipFill>
-        <p:spPr>
-          <a:xfrm>
-            <a:off x="263465" y="398530"/>
-            <a:ext cx="5120827" cy="556906"/>
-          </a:xfrm>
-          <a:prstGeom prst="rect">
-            <a:avLst/>
-          </a:prstGeom>
-        </p:spPr>
-      </p:pic>
+            <a:r>
+              <a:rPr lang="en-US" sz="3200" dirty="0"/>
+              <a:t>Check for missing values</a:t>
+            </a:r>
+          </a:p>
+        </p:txBody>
+      </p:sp>
     </p:spTree>
     <p:extLst>
       <p:ext uri="{BB962C8B-B14F-4D97-AF65-F5344CB8AC3E}">
-        <p14:creationId xmlns:p14="http://schemas.microsoft.com/office/powerpoint/2010/main" val="1318105486"/>
+        <p14:creationId xmlns:p14="http://schemas.microsoft.com/office/powerpoint/2010/main" val="1908492203"/>
       </p:ext>
     </p:extLst>
   </p:cSld>
@@ -5681,6 +5888,187 @@
               <a:rPr lang="en-US" sz="3200" dirty="0"/>
               <a:t>Goals for today</a:t>
             </a:r>
+          </a:p>
+        </p:txBody>
+      </p:sp>
+      <p:sp>
+        <p:nvSpPr>
+          <p:cNvPr id="3" name="TextBox 2">
+            <a:extLst>
+              <a:ext uri="{FF2B5EF4-FFF2-40B4-BE49-F238E27FC236}">
+                <a16:creationId xmlns:a16="http://schemas.microsoft.com/office/drawing/2014/main" id="{19DCC09A-460B-AC0E-16BF-B9DEE9EE6DAA}"/>
+              </a:ext>
+            </a:extLst>
+          </p:cNvPr>
+          <p:cNvSpPr txBox="1"/>
+          <p:nvPr/>
+        </p:nvSpPr>
+        <p:spPr>
+          <a:xfrm>
+            <a:off x="429869" y="1230992"/>
+            <a:ext cx="8284261" cy="5324535"/>
+          </a:xfrm>
+          <a:prstGeom prst="rect">
+            <a:avLst/>
+          </a:prstGeom>
+          <a:noFill/>
+        </p:spPr>
+        <p:txBody>
+          <a:bodyPr wrap="square" rtlCol="0">
+            <a:spAutoFit/>
+          </a:bodyPr>
+          <a:lstStyle/>
+          <a:p>
+            <a:pPr marL="457200" indent="-457200">
+              <a:spcBef>
+                <a:spcPts val="600"/>
+              </a:spcBef>
+              <a:spcAft>
+                <a:spcPts val="600"/>
+              </a:spcAft>
+              <a:buFont typeface="Arial" panose="020B0604020202020204" pitchFamily="34" charset="0"/>
+              <a:buChar char="•"/>
+            </a:pPr>
+            <a:r>
+              <a:rPr lang="en-US" sz="2600" b="1" dirty="0"/>
+              <a:t>Understand </a:t>
+            </a:r>
+            <a:r>
+              <a:rPr lang="en-US" sz="2600" dirty="0"/>
+              <a:t>what data management is</a:t>
+            </a:r>
+          </a:p>
+          <a:p>
+            <a:pPr marL="457200" indent="-457200">
+              <a:spcBef>
+                <a:spcPts val="600"/>
+              </a:spcBef>
+              <a:spcAft>
+                <a:spcPts val="600"/>
+              </a:spcAft>
+              <a:buFont typeface="Arial" panose="020B0604020202020204" pitchFamily="34" charset="0"/>
+              <a:buChar char="•"/>
+            </a:pPr>
+            <a:r>
+              <a:rPr lang="en-US" sz="2600" b="1" dirty="0"/>
+              <a:t>Identify</a:t>
+            </a:r>
+            <a:r>
+              <a:rPr lang="en-US" sz="2600" dirty="0"/>
+              <a:t> some interesting sources of healthcare and public health data (if you don’t already have your own)</a:t>
+            </a:r>
+          </a:p>
+          <a:p>
+            <a:pPr marL="457200" indent="-457200">
+              <a:spcBef>
+                <a:spcPts val="600"/>
+              </a:spcBef>
+              <a:spcAft>
+                <a:spcPts val="600"/>
+              </a:spcAft>
+              <a:buFont typeface="Arial" panose="020B0604020202020204" pitchFamily="34" charset="0"/>
+              <a:buChar char="•"/>
+            </a:pPr>
+            <a:r>
+              <a:rPr lang="en-US" sz="2600" b="1" dirty="0"/>
+              <a:t>Load and clean</a:t>
+            </a:r>
+            <a:r>
+              <a:rPr lang="en-US" sz="2600" dirty="0"/>
+              <a:t> your first dataset in R</a:t>
+            </a:r>
+          </a:p>
+          <a:p>
+            <a:pPr marL="457200" indent="-457200">
+              <a:spcBef>
+                <a:spcPts val="600"/>
+              </a:spcBef>
+              <a:spcAft>
+                <a:spcPts val="600"/>
+              </a:spcAft>
+              <a:buFont typeface="Arial" panose="020B0604020202020204" pitchFamily="34" charset="0"/>
+              <a:buChar char="•"/>
+            </a:pPr>
+            <a:r>
+              <a:rPr lang="en-US" sz="2600" b="1" dirty="0"/>
+              <a:t>Learn about and implement </a:t>
+            </a:r>
+            <a:r>
+              <a:rPr lang="en-US" sz="2600" dirty="0"/>
+              <a:t>best practices for:</a:t>
+            </a:r>
+          </a:p>
+          <a:p>
+            <a:pPr marL="914400" lvl="1" indent="-457200">
+              <a:spcBef>
+                <a:spcPts val="600"/>
+              </a:spcBef>
+              <a:spcAft>
+                <a:spcPts val="600"/>
+              </a:spcAft>
+              <a:buFont typeface="Arial" panose="020B0604020202020204" pitchFamily="34" charset="0"/>
+              <a:buChar char="•"/>
+            </a:pPr>
+            <a:r>
+              <a:rPr lang="en-US" sz="2600" dirty="0"/>
+              <a:t>documenting your code</a:t>
+            </a:r>
+          </a:p>
+          <a:p>
+            <a:pPr marL="914400" lvl="1" indent="-457200">
+              <a:spcBef>
+                <a:spcPts val="600"/>
+              </a:spcBef>
+              <a:spcAft>
+                <a:spcPts val="600"/>
+              </a:spcAft>
+              <a:buFont typeface="Arial" panose="020B0604020202020204" pitchFamily="34" charset="0"/>
+              <a:buChar char="•"/>
+            </a:pPr>
+            <a:r>
+              <a:rPr lang="en-US" sz="2600" dirty="0"/>
+              <a:t>data dictionaries</a:t>
+            </a:r>
+          </a:p>
+          <a:p>
+            <a:pPr marL="914400" lvl="1" indent="-457200">
+              <a:spcBef>
+                <a:spcPts val="600"/>
+              </a:spcBef>
+              <a:spcAft>
+                <a:spcPts val="600"/>
+              </a:spcAft>
+              <a:buFont typeface="Arial" panose="020B0604020202020204" pitchFamily="34" charset="0"/>
+              <a:buChar char="•"/>
+            </a:pPr>
+            <a:r>
+              <a:rPr lang="en-US" sz="2600" dirty="0"/>
+              <a:t>Doing reproducible research in R</a:t>
+            </a:r>
+          </a:p>
+          <a:p>
+            <a:pPr lvl="1">
+              <a:spcBef>
+                <a:spcPts val="600"/>
+              </a:spcBef>
+              <a:spcAft>
+                <a:spcPts val="600"/>
+              </a:spcAft>
+            </a:pPr>
+            <a:endParaRPr lang="en-US" sz="2600" dirty="0"/>
+          </a:p>
+          <a:p>
+            <a:pPr marL="457200" indent="-457200">
+              <a:spcBef>
+                <a:spcPts val="600"/>
+              </a:spcBef>
+              <a:spcAft>
+                <a:spcPts val="600"/>
+              </a:spcAft>
+              <a:buFont typeface="Arial" panose="020B0604020202020204" pitchFamily="34" charset="0"/>
+              <a:buChar char="•"/>
+            </a:pPr>
+            <a:endParaRPr lang="en-US" sz="2600" dirty="0"/>
           </a:p>
         </p:txBody>
       </p:sp>
@@ -5730,8 +6118,8 @@
         </p:nvSpPr>
         <p:spPr>
           <a:xfrm>
-            <a:off x="429869" y="306381"/>
-            <a:ext cx="8158959" cy="1143000"/>
+            <a:off x="429870" y="306381"/>
+            <a:ext cx="6598728" cy="1143000"/>
           </a:xfrm>
           <a:prstGeom prst="rect">
             <a:avLst/>
@@ -5760,7 +6148,7 @@
           <a:p>
             <a:r>
               <a:rPr lang="en-US" sz="3200" dirty="0"/>
-              <a:t>Interesting and useful datasets</a:t>
+              <a:t>Ask questions about your data</a:t>
             </a:r>
           </a:p>
         </p:txBody>
@@ -5768,7 +6156,7 @@
     </p:spTree>
     <p:extLst>
       <p:ext uri="{BB962C8B-B14F-4D97-AF65-F5344CB8AC3E}">
-        <p14:creationId xmlns:p14="http://schemas.microsoft.com/office/powerpoint/2010/main" val="2331100196"/>
+        <p14:creationId xmlns:p14="http://schemas.microsoft.com/office/powerpoint/2010/main" val="2484998092"/>
       </p:ext>
     </p:extLst>
   </p:cSld>
@@ -5883,7 +6271,7 @@
                 <a:latin typeface="Helvetica Neue"/>
                 <a:cs typeface="Helvetica Neue"/>
               </a:rPr>
-              <a:t>Documenting your data, code, and results</a:t>
+              <a:t>Healthcare and public health datasets</a:t>
             </a:r>
           </a:p>
         </p:txBody>
@@ -5914,7 +6302,7 @@
     </p:spTree>
     <p:extLst>
       <p:ext uri="{BB962C8B-B14F-4D97-AF65-F5344CB8AC3E}">
-        <p14:creationId xmlns:p14="http://schemas.microsoft.com/office/powerpoint/2010/main" val="611800984"/>
+        <p14:creationId xmlns:p14="http://schemas.microsoft.com/office/powerpoint/2010/main" val="1318105486"/>
       </p:ext>
     </p:extLst>
   </p:cSld>
@@ -5987,7 +6375,7 @@
           <a:p>
             <a:r>
               <a:rPr lang="en-US" sz="3200" dirty="0"/>
-              <a:t>Documentation</a:t>
+              <a:t>Interesting and useful datasets</a:t>
             </a:r>
           </a:p>
         </p:txBody>
@@ -5995,7 +6383,7 @@
     </p:spTree>
     <p:extLst>
       <p:ext uri="{BB962C8B-B14F-4D97-AF65-F5344CB8AC3E}">
-        <p14:creationId xmlns:p14="http://schemas.microsoft.com/office/powerpoint/2010/main" val="826674946"/>
+        <p14:creationId xmlns:p14="http://schemas.microsoft.com/office/powerpoint/2010/main" val="2331100196"/>
       </p:ext>
     </p:extLst>
   </p:cSld>
@@ -6024,13 +6412,48 @@
       </p:grpSpPr>
       <p:sp>
         <p:nvSpPr>
-          <p:cNvPr id="2" name="Title 2">
-            <a:extLst>
-              <a:ext uri="{FF2B5EF4-FFF2-40B4-BE49-F238E27FC236}">
-                <a16:creationId xmlns:a16="http://schemas.microsoft.com/office/drawing/2014/main" id="{12BEE06C-3CB4-1A31-1F99-81886307D619}"/>
-              </a:ext>
-            </a:extLst>
-          </p:cNvPr>
+          <p:cNvPr id="10" name="Rectangle 9"/>
+          <p:cNvSpPr/>
+          <p:nvPr/>
+        </p:nvSpPr>
+        <p:spPr>
+          <a:xfrm>
+            <a:off x="-1" y="1330504"/>
+            <a:ext cx="9144001" cy="5527496"/>
+          </a:xfrm>
+          <a:prstGeom prst="rect">
+            <a:avLst/>
+          </a:prstGeom>
+          <a:solidFill>
+            <a:srgbClr val="041E42"/>
+          </a:solidFill>
+        </p:spPr>
+        <p:style>
+          <a:lnRef idx="1">
+            <a:schemeClr val="accent1"/>
+          </a:lnRef>
+          <a:fillRef idx="3">
+            <a:schemeClr val="accent1"/>
+          </a:fillRef>
+          <a:effectRef idx="2">
+            <a:schemeClr val="accent1"/>
+          </a:effectRef>
+          <a:fontRef idx="minor">
+            <a:schemeClr val="lt1"/>
+          </a:fontRef>
+        </p:style>
+        <p:txBody>
+          <a:bodyPr rtlCol="0" anchor="ctr"/>
+          <a:lstStyle/>
+          <a:p>
+            <a:pPr algn="ctr"/>
+            <a:endParaRPr lang="en-US" sz="1350" dirty="0"/>
+          </a:p>
+        </p:txBody>
+      </p:sp>
+      <p:sp>
+        <p:nvSpPr>
+          <p:cNvPr id="8" name="Title 5"/>
           <p:cNvSpPr txBox="1">
             <a:spLocks/>
           </p:cNvSpPr>
@@ -6038,8 +6461,8 @@
         </p:nvSpPr>
         <p:spPr>
           <a:xfrm>
-            <a:off x="429869" y="306381"/>
-            <a:ext cx="8158959" cy="1143000"/>
+            <a:off x="383218" y="1477992"/>
+            <a:ext cx="7954732" cy="815898"/>
           </a:xfrm>
           <a:prstGeom prst="rect">
             <a:avLst/>
@@ -6050,38 +6473,63 @@
             <a:noAutofit/>
           </a:bodyPr>
           <a:lstStyle>
-            <a:lvl1pPr algn="l" defTabSz="342991" rtl="0" eaLnBrk="1" latinLnBrk="0" hangingPunct="1">
+            <a:lvl1pPr algn="ctr" defTabSz="457200" rtl="0" eaLnBrk="1" latinLnBrk="0" hangingPunct="1">
               <a:spcBef>
                 <a:spcPct val="0"/>
               </a:spcBef>
               <a:buNone/>
-              <a:defRPr sz="2701" b="1" i="0" kern="1200">
+              <a:defRPr sz="4200" b="0" i="1" kern="1200">
                 <a:solidFill>
                   <a:srgbClr val="002D50"/>
                 </a:solidFill>
-                <a:latin typeface="Helvetica Neue"/>
+                <a:latin typeface="Adobe Caslon Pro"/>
                 <a:ea typeface="+mj-ea"/>
-                <a:cs typeface="Helvetica Neue"/>
+                <a:cs typeface="Adobe Caslon Pro"/>
               </a:defRPr>
             </a:lvl1pPr>
           </a:lstStyle>
           <a:p>
-            <a:r>
-              <a:rPr lang="en-US" sz="3200" dirty="0"/>
-              <a:t>Documenting </a:t>
-            </a:r>
-            <a:r>
-              <a:rPr lang="en-US" sz="3200" dirty="0" err="1"/>
-              <a:t>datsets</a:t>
-            </a:r>
-            <a:endParaRPr lang="en-US" sz="3200" dirty="0"/>
-          </a:p>
-        </p:txBody>
-      </p:sp>
+            <a:pPr algn="l"/>
+            <a:r>
+              <a:rPr lang="en-US" sz="4051" dirty="0">
+                <a:solidFill>
+                  <a:schemeClr val="bg1"/>
+                </a:solidFill>
+                <a:latin typeface="Helvetica Neue"/>
+                <a:cs typeface="Helvetica Neue"/>
+              </a:rPr>
+              <a:t>Documenting your data, code, and results</a:t>
+            </a:r>
+          </a:p>
+        </p:txBody>
+      </p:sp>
+      <p:pic>
+        <p:nvPicPr>
+          <p:cNvPr id="12" name="Picture 11"/>
+          <p:cNvPicPr>
+            <a:picLocks noChangeAspect="1"/>
+          </p:cNvPicPr>
+          <p:nvPr/>
+        </p:nvPicPr>
+        <p:blipFill>
+          <a:blip r:embed="rId3"/>
+          <a:srcRect/>
+          <a:stretch/>
+        </p:blipFill>
+        <p:spPr>
+          <a:xfrm>
+            <a:off x="263465" y="398530"/>
+            <a:ext cx="5120827" cy="556906"/>
+          </a:xfrm>
+          <a:prstGeom prst="rect">
+            <a:avLst/>
+          </a:prstGeom>
+        </p:spPr>
+      </p:pic>
     </p:spTree>
     <p:extLst>
       <p:ext uri="{BB962C8B-B14F-4D97-AF65-F5344CB8AC3E}">
-        <p14:creationId xmlns:p14="http://schemas.microsoft.com/office/powerpoint/2010/main" val="3116023382"/>
+        <p14:creationId xmlns:p14="http://schemas.microsoft.com/office/powerpoint/2010/main" val="611800984"/>
       </p:ext>
     </p:extLst>
   </p:cSld>
@@ -6154,7 +6602,7 @@
           <a:p>
             <a:r>
               <a:rPr lang="en-US" sz="3200" dirty="0"/>
-              <a:t>Documenting code</a:t>
+              <a:t>Documentation</a:t>
             </a:r>
           </a:p>
         </p:txBody>
@@ -6162,7 +6610,7 @@
     </p:spTree>
     <p:extLst>
       <p:ext uri="{BB962C8B-B14F-4D97-AF65-F5344CB8AC3E}">
-        <p14:creationId xmlns:p14="http://schemas.microsoft.com/office/powerpoint/2010/main" val="4098021137"/>
+        <p14:creationId xmlns:p14="http://schemas.microsoft.com/office/powerpoint/2010/main" val="826674946"/>
       </p:ext>
     </p:extLst>
   </p:cSld>
@@ -6235,15 +6683,20 @@
           <a:p>
             <a:r>
               <a:rPr lang="en-US" sz="3200" dirty="0"/>
-              <a:t>Reproducible results</a:t>
-            </a:r>
+              <a:t>Documenting </a:t>
+            </a:r>
+            <a:r>
+              <a:rPr lang="en-US" sz="3200" dirty="0" err="1"/>
+              <a:t>datsets</a:t>
+            </a:r>
+            <a:endParaRPr lang="en-US" sz="3200" dirty="0"/>
           </a:p>
         </p:txBody>
       </p:sp>
     </p:spTree>
     <p:extLst>
       <p:ext uri="{BB962C8B-B14F-4D97-AF65-F5344CB8AC3E}">
-        <p14:creationId xmlns:p14="http://schemas.microsoft.com/office/powerpoint/2010/main" val="3435457308"/>
+        <p14:creationId xmlns:p14="http://schemas.microsoft.com/office/powerpoint/2010/main" val="3116023382"/>
       </p:ext>
     </p:extLst>
   </p:cSld>
@@ -6316,6 +6769,168 @@
           <a:p>
             <a:r>
               <a:rPr lang="en-US" sz="3200" dirty="0"/>
+              <a:t>Documenting code</a:t>
+            </a:r>
+          </a:p>
+        </p:txBody>
+      </p:sp>
+    </p:spTree>
+    <p:extLst>
+      <p:ext uri="{BB962C8B-B14F-4D97-AF65-F5344CB8AC3E}">
+        <p14:creationId xmlns:p14="http://schemas.microsoft.com/office/powerpoint/2010/main" val="4098021137"/>
+      </p:ext>
+    </p:extLst>
+  </p:cSld>
+  <p:clrMapOvr>
+    <a:masterClrMapping/>
+  </p:clrMapOvr>
+</p:sld>
+</file>
+
+<file path=ppt/slides/slide27.xml><?xml version="1.0" encoding="utf-8"?>
+<p:sld xmlns:a="http://schemas.openxmlformats.org/drawingml/2006/main" xmlns:r="http://schemas.openxmlformats.org/officeDocument/2006/relationships" xmlns:p="http://schemas.openxmlformats.org/presentationml/2006/main">
+  <p:cSld>
+    <p:spTree>
+      <p:nvGrpSpPr>
+        <p:cNvPr id="1" name=""/>
+        <p:cNvGrpSpPr/>
+        <p:nvPr/>
+      </p:nvGrpSpPr>
+      <p:grpSpPr>
+        <a:xfrm>
+          <a:off x="0" y="0"/>
+          <a:ext cx="0" cy="0"/>
+          <a:chOff x="0" y="0"/>
+          <a:chExt cx="0" cy="0"/>
+        </a:xfrm>
+      </p:grpSpPr>
+      <p:sp>
+        <p:nvSpPr>
+          <p:cNvPr id="2" name="Title 2">
+            <a:extLst>
+              <a:ext uri="{FF2B5EF4-FFF2-40B4-BE49-F238E27FC236}">
+                <a16:creationId xmlns:a16="http://schemas.microsoft.com/office/drawing/2014/main" id="{12BEE06C-3CB4-1A31-1F99-81886307D619}"/>
+              </a:ext>
+            </a:extLst>
+          </p:cNvPr>
+          <p:cNvSpPr txBox="1">
+            <a:spLocks/>
+          </p:cNvSpPr>
+          <p:nvPr/>
+        </p:nvSpPr>
+        <p:spPr>
+          <a:xfrm>
+            <a:off x="429869" y="306381"/>
+            <a:ext cx="8158959" cy="1143000"/>
+          </a:xfrm>
+          <a:prstGeom prst="rect">
+            <a:avLst/>
+          </a:prstGeom>
+        </p:spPr>
+        <p:txBody>
+          <a:bodyPr>
+            <a:noAutofit/>
+          </a:bodyPr>
+          <a:lstStyle>
+            <a:lvl1pPr algn="l" defTabSz="342991" rtl="0" eaLnBrk="1" latinLnBrk="0" hangingPunct="1">
+              <a:spcBef>
+                <a:spcPct val="0"/>
+              </a:spcBef>
+              <a:buNone/>
+              <a:defRPr sz="2701" b="1" i="0" kern="1200">
+                <a:solidFill>
+                  <a:srgbClr val="002D50"/>
+                </a:solidFill>
+                <a:latin typeface="Helvetica Neue"/>
+                <a:ea typeface="+mj-ea"/>
+                <a:cs typeface="Helvetica Neue"/>
+              </a:defRPr>
+            </a:lvl1pPr>
+          </a:lstStyle>
+          <a:p>
+            <a:r>
+              <a:rPr lang="en-US" sz="3200" dirty="0"/>
+              <a:t>Reproducible results</a:t>
+            </a:r>
+          </a:p>
+        </p:txBody>
+      </p:sp>
+    </p:spTree>
+    <p:extLst>
+      <p:ext uri="{BB962C8B-B14F-4D97-AF65-F5344CB8AC3E}">
+        <p14:creationId xmlns:p14="http://schemas.microsoft.com/office/powerpoint/2010/main" val="3435457308"/>
+      </p:ext>
+    </p:extLst>
+  </p:cSld>
+  <p:clrMapOvr>
+    <a:masterClrMapping/>
+  </p:clrMapOvr>
+</p:sld>
+</file>
+
+<file path=ppt/slides/slide28.xml><?xml version="1.0" encoding="utf-8"?>
+<p:sld xmlns:a="http://schemas.openxmlformats.org/drawingml/2006/main" xmlns:r="http://schemas.openxmlformats.org/officeDocument/2006/relationships" xmlns:p="http://schemas.openxmlformats.org/presentationml/2006/main">
+  <p:cSld>
+    <p:spTree>
+      <p:nvGrpSpPr>
+        <p:cNvPr id="1" name=""/>
+        <p:cNvGrpSpPr/>
+        <p:nvPr/>
+      </p:nvGrpSpPr>
+      <p:grpSpPr>
+        <a:xfrm>
+          <a:off x="0" y="0"/>
+          <a:ext cx="0" cy="0"/>
+          <a:chOff x="0" y="0"/>
+          <a:chExt cx="0" cy="0"/>
+        </a:xfrm>
+      </p:grpSpPr>
+      <p:sp>
+        <p:nvSpPr>
+          <p:cNvPr id="2" name="Title 2">
+            <a:extLst>
+              <a:ext uri="{FF2B5EF4-FFF2-40B4-BE49-F238E27FC236}">
+                <a16:creationId xmlns:a16="http://schemas.microsoft.com/office/drawing/2014/main" id="{12BEE06C-3CB4-1A31-1F99-81886307D619}"/>
+              </a:ext>
+            </a:extLst>
+          </p:cNvPr>
+          <p:cNvSpPr txBox="1">
+            <a:spLocks/>
+          </p:cNvSpPr>
+          <p:nvPr/>
+        </p:nvSpPr>
+        <p:spPr>
+          <a:xfrm>
+            <a:off x="429869" y="306381"/>
+            <a:ext cx="8158959" cy="1143000"/>
+          </a:xfrm>
+          <a:prstGeom prst="rect">
+            <a:avLst/>
+          </a:prstGeom>
+        </p:spPr>
+        <p:txBody>
+          <a:bodyPr>
+            <a:noAutofit/>
+          </a:bodyPr>
+          <a:lstStyle>
+            <a:lvl1pPr algn="l" defTabSz="342991" rtl="0" eaLnBrk="1" latinLnBrk="0" hangingPunct="1">
+              <a:spcBef>
+                <a:spcPct val="0"/>
+              </a:spcBef>
+              <a:buNone/>
+              <a:defRPr sz="2701" b="1" i="0" kern="1200">
+                <a:solidFill>
+                  <a:srgbClr val="002D50"/>
+                </a:solidFill>
+                <a:latin typeface="Helvetica Neue"/>
+                <a:ea typeface="+mj-ea"/>
+                <a:cs typeface="Helvetica Neue"/>
+              </a:defRPr>
+            </a:lvl1pPr>
+          </a:lstStyle>
+          <a:p>
+            <a:r>
+              <a:rPr lang="en-US" sz="3200" dirty="0"/>
               <a:t>Open-source science</a:t>
             </a:r>
           </a:p>
@@ -6334,7 +6949,7 @@
 </p:sld>
 </file>
 
-<file path=ppt/slides/slide27.xml><?xml version="1.0" encoding="utf-8"?>
+<file path=ppt/slides/slide29.xml><?xml version="1.0" encoding="utf-8"?>
 <p:sld xmlns:a="http://schemas.openxmlformats.org/drawingml/2006/main" xmlns:r="http://schemas.openxmlformats.org/officeDocument/2006/relationships" xmlns:p="http://schemas.openxmlformats.org/presentationml/2006/main">
   <p:cSld>
     <p:spTree>
@@ -6613,7 +7228,7 @@
                 <a:latin typeface="Helvetica Neue"/>
                 <a:cs typeface="Helvetica Neue"/>
               </a:rPr>
-              <a:t>Data types and structures in R</a:t>
+              <a:t>What is data management</a:t>
             </a:r>
           </a:p>
         </p:txBody>
@@ -6644,7 +7259,7 @@
     </p:spTree>
     <p:extLst>
       <p:ext uri="{BB962C8B-B14F-4D97-AF65-F5344CB8AC3E}">
-        <p14:creationId xmlns:p14="http://schemas.microsoft.com/office/powerpoint/2010/main" val="3067880805"/>
+        <p14:creationId xmlns:p14="http://schemas.microsoft.com/office/powerpoint/2010/main" val="1737944682"/>
       </p:ext>
     </p:extLst>
   </p:cSld>
@@ -6671,12 +7286,42 @@
           <a:chExt cx="0" cy="0"/>
         </a:xfrm>
       </p:grpSpPr>
-      <p:sp>
-        <p:nvSpPr>
-          <p:cNvPr id="2" name="Title 2">
+      <p:pic>
+        <p:nvPicPr>
+          <p:cNvPr id="3" name="Picture 2">
             <a:extLst>
               <a:ext uri="{FF2B5EF4-FFF2-40B4-BE49-F238E27FC236}">
-                <a16:creationId xmlns:a16="http://schemas.microsoft.com/office/drawing/2014/main" id="{12BEE06C-3CB4-1A31-1F99-81886307D619}"/>
+                <a16:creationId xmlns:a16="http://schemas.microsoft.com/office/drawing/2014/main" id="{32A4A1C0-B85D-EC16-2E15-27A79BA603FE}"/>
+              </a:ext>
+            </a:extLst>
+          </p:cNvPr>
+          <p:cNvPicPr>
+            <a:picLocks noChangeAspect="1"/>
+          </p:cNvPicPr>
+          <p:nvPr/>
+        </p:nvPicPr>
+        <p:blipFill>
+          <a:blip r:embed="rId3"/>
+          <a:stretch>
+            <a:fillRect/>
+          </a:stretch>
+        </p:blipFill>
+        <p:spPr>
+          <a:xfrm>
+            <a:off x="4155085" y="868679"/>
+            <a:ext cx="4695002" cy="4470763"/>
+          </a:xfrm>
+          <a:prstGeom prst="rect">
+            <a:avLst/>
+          </a:prstGeom>
+        </p:spPr>
+      </p:pic>
+      <p:sp>
+        <p:nvSpPr>
+          <p:cNvPr id="4" name="Title 2">
+            <a:extLst>
+              <a:ext uri="{FF2B5EF4-FFF2-40B4-BE49-F238E27FC236}">
+                <a16:creationId xmlns:a16="http://schemas.microsoft.com/office/drawing/2014/main" id="{190BEDCE-54AE-60FC-D597-81472A632DE0}"/>
               </a:ext>
             </a:extLst>
           </p:cNvPr>
@@ -6717,7 +7362,7 @@
           <a:p>
             <a:r>
               <a:rPr lang="en-US" sz="3200" dirty="0"/>
-              <a:t>Data types in R</a:t>
+              <a:t>Data management</a:t>
             </a:r>
           </a:p>
         </p:txBody>
@@ -6725,7 +7370,7 @@
     </p:spTree>
     <p:extLst>
       <p:ext uri="{BB962C8B-B14F-4D97-AF65-F5344CB8AC3E}">
-        <p14:creationId xmlns:p14="http://schemas.microsoft.com/office/powerpoint/2010/main" val="2734654945"/>
+        <p14:creationId xmlns:p14="http://schemas.microsoft.com/office/powerpoint/2010/main" val="3023104463"/>
       </p:ext>
     </p:extLst>
   </p:cSld>
@@ -6754,13 +7399,48 @@
       </p:grpSpPr>
       <p:sp>
         <p:nvSpPr>
-          <p:cNvPr id="2" name="Title 2">
-            <a:extLst>
-              <a:ext uri="{FF2B5EF4-FFF2-40B4-BE49-F238E27FC236}">
-                <a16:creationId xmlns:a16="http://schemas.microsoft.com/office/drawing/2014/main" id="{12BEE06C-3CB4-1A31-1F99-81886307D619}"/>
-              </a:ext>
-            </a:extLst>
-          </p:cNvPr>
+          <p:cNvPr id="10" name="Rectangle 9"/>
+          <p:cNvSpPr/>
+          <p:nvPr/>
+        </p:nvSpPr>
+        <p:spPr>
+          <a:xfrm>
+            <a:off x="-1" y="1330504"/>
+            <a:ext cx="9144001" cy="5527496"/>
+          </a:xfrm>
+          <a:prstGeom prst="rect">
+            <a:avLst/>
+          </a:prstGeom>
+          <a:solidFill>
+            <a:srgbClr val="041E42"/>
+          </a:solidFill>
+        </p:spPr>
+        <p:style>
+          <a:lnRef idx="1">
+            <a:schemeClr val="accent1"/>
+          </a:lnRef>
+          <a:fillRef idx="3">
+            <a:schemeClr val="accent1"/>
+          </a:fillRef>
+          <a:effectRef idx="2">
+            <a:schemeClr val="accent1"/>
+          </a:effectRef>
+          <a:fontRef idx="minor">
+            <a:schemeClr val="lt1"/>
+          </a:fontRef>
+        </p:style>
+        <p:txBody>
+          <a:bodyPr rtlCol="0" anchor="ctr"/>
+          <a:lstStyle/>
+          <a:p>
+            <a:pPr algn="ctr"/>
+            <a:endParaRPr lang="en-US" sz="1350" dirty="0"/>
+          </a:p>
+        </p:txBody>
+      </p:sp>
+      <p:sp>
+        <p:nvSpPr>
+          <p:cNvPr id="8" name="Title 5"/>
           <p:cNvSpPr txBox="1">
             <a:spLocks/>
           </p:cNvSpPr>
@@ -6768,8 +7448,8 @@
         </p:nvSpPr>
         <p:spPr>
           <a:xfrm>
-            <a:off x="429870" y="306381"/>
-            <a:ext cx="6598728" cy="1143000"/>
+            <a:off x="383218" y="1477992"/>
+            <a:ext cx="7954732" cy="815898"/>
           </a:xfrm>
           <a:prstGeom prst="rect">
             <a:avLst/>
@@ -6780,33 +7460,63 @@
             <a:noAutofit/>
           </a:bodyPr>
           <a:lstStyle>
-            <a:lvl1pPr algn="l" defTabSz="342991" rtl="0" eaLnBrk="1" latinLnBrk="0" hangingPunct="1">
+            <a:lvl1pPr algn="ctr" defTabSz="457200" rtl="0" eaLnBrk="1" latinLnBrk="0" hangingPunct="1">
               <a:spcBef>
                 <a:spcPct val="0"/>
               </a:spcBef>
               <a:buNone/>
-              <a:defRPr sz="2701" b="1" i="0" kern="1200">
+              <a:defRPr sz="4200" b="0" i="1" kern="1200">
                 <a:solidFill>
                   <a:srgbClr val="002D50"/>
                 </a:solidFill>
-                <a:latin typeface="Helvetica Neue"/>
+                <a:latin typeface="Adobe Caslon Pro"/>
                 <a:ea typeface="+mj-ea"/>
-                <a:cs typeface="Helvetica Neue"/>
+                <a:cs typeface="Adobe Caslon Pro"/>
               </a:defRPr>
             </a:lvl1pPr>
           </a:lstStyle>
           <a:p>
-            <a:r>
-              <a:rPr lang="en-US" sz="3200" dirty="0"/>
-              <a:t>Numeric Data</a:t>
-            </a:r>
-          </a:p>
-        </p:txBody>
-      </p:sp>
+            <a:pPr algn="l"/>
+            <a:r>
+              <a:rPr lang="en-US" sz="4051" dirty="0">
+                <a:solidFill>
+                  <a:schemeClr val="bg1"/>
+                </a:solidFill>
+                <a:latin typeface="Helvetica Neue"/>
+                <a:cs typeface="Helvetica Neue"/>
+              </a:rPr>
+              <a:t>Data types and structures in R</a:t>
+            </a:r>
+          </a:p>
+        </p:txBody>
+      </p:sp>
+      <p:pic>
+        <p:nvPicPr>
+          <p:cNvPr id="12" name="Picture 11"/>
+          <p:cNvPicPr>
+            <a:picLocks noChangeAspect="1"/>
+          </p:cNvPicPr>
+          <p:nvPr/>
+        </p:nvPicPr>
+        <p:blipFill>
+          <a:blip r:embed="rId3"/>
+          <a:srcRect/>
+          <a:stretch/>
+        </p:blipFill>
+        <p:spPr>
+          <a:xfrm>
+            <a:off x="263465" y="398530"/>
+            <a:ext cx="5120827" cy="556906"/>
+          </a:xfrm>
+          <a:prstGeom prst="rect">
+            <a:avLst/>
+          </a:prstGeom>
+        </p:spPr>
+      </p:pic>
     </p:spTree>
     <p:extLst>
       <p:ext uri="{BB962C8B-B14F-4D97-AF65-F5344CB8AC3E}">
-        <p14:creationId xmlns:p14="http://schemas.microsoft.com/office/powerpoint/2010/main" val="971419185"/>
+        <p14:creationId xmlns:p14="http://schemas.microsoft.com/office/powerpoint/2010/main" val="3067880805"/>
       </p:ext>
     </p:extLst>
   </p:cSld>
@@ -6879,7 +7589,7 @@
           <a:p>
             <a:r>
               <a:rPr lang="en-US" sz="3200" dirty="0"/>
-              <a:t>Character Data</a:t>
+              <a:t>Data types in R</a:t>
             </a:r>
           </a:p>
         </p:txBody>
@@ -6887,7 +7597,7 @@
     </p:spTree>
     <p:extLst>
       <p:ext uri="{BB962C8B-B14F-4D97-AF65-F5344CB8AC3E}">
-        <p14:creationId xmlns:p14="http://schemas.microsoft.com/office/powerpoint/2010/main" val="661556026"/>
+        <p14:creationId xmlns:p14="http://schemas.microsoft.com/office/powerpoint/2010/main" val="2734654945"/>
       </p:ext>
     </p:extLst>
   </p:cSld>
@@ -6960,7 +7670,7 @@
           <a:p>
             <a:r>
               <a:rPr lang="en-US" sz="3200" dirty="0"/>
-              <a:t>Logical Data</a:t>
+              <a:t>Numeric Data</a:t>
             </a:r>
           </a:p>
         </p:txBody>
@@ -6968,7 +7678,7 @@
     </p:spTree>
     <p:extLst>
       <p:ext uri="{BB962C8B-B14F-4D97-AF65-F5344CB8AC3E}">
-        <p14:creationId xmlns:p14="http://schemas.microsoft.com/office/powerpoint/2010/main" val="4276374785"/>
+        <p14:creationId xmlns:p14="http://schemas.microsoft.com/office/powerpoint/2010/main" val="971419185"/>
       </p:ext>
     </p:extLst>
   </p:cSld>
@@ -7041,7 +7751,7 @@
           <a:p>
             <a:r>
               <a:rPr lang="en-US" sz="3200" dirty="0"/>
-              <a:t>Check your understanding</a:t>
+              <a:t>Character Data</a:t>
             </a:r>
           </a:p>
         </p:txBody>
@@ -7049,7 +7759,7 @@
     </p:spTree>
     <p:extLst>
       <p:ext uri="{BB962C8B-B14F-4D97-AF65-F5344CB8AC3E}">
-        <p14:creationId xmlns:p14="http://schemas.microsoft.com/office/powerpoint/2010/main" val="3384428109"/>
+        <p14:creationId xmlns:p14="http://schemas.microsoft.com/office/powerpoint/2010/main" val="661556026"/>
       </p:ext>
     </p:extLst>
   </p:cSld>
@@ -7122,7 +7832,7 @@
           <a:p>
             <a:r>
               <a:rPr lang="en-US" sz="3200" dirty="0"/>
-              <a:t>Data Structures in R</a:t>
+              <a:t>Logical Data</a:t>
             </a:r>
           </a:p>
         </p:txBody>
@@ -7130,7 +7840,7 @@
     </p:spTree>
     <p:extLst>
       <p:ext uri="{BB962C8B-B14F-4D97-AF65-F5344CB8AC3E}">
-        <p14:creationId xmlns:p14="http://schemas.microsoft.com/office/powerpoint/2010/main" val="3233372863"/>
+        <p14:creationId xmlns:p14="http://schemas.microsoft.com/office/powerpoint/2010/main" val="4276374785"/>
       </p:ext>
     </p:extLst>
   </p:cSld>

</xml_diff>